<commit_message>
Deliverables, Dataset Creation Pipeline design
</commit_message>
<xml_diff>
--- a/Testing Results/Vishing_Testing_Results_v2.0.pptx
+++ b/Testing Results/Vishing_Testing_Results_v2.0.pptx
@@ -278,7 +278,7 @@
           <a:p>
             <a:fld id="{F09E5490-7079-428D-BA25-82A7CA4C46C9}" type="datetimeFigureOut">
               <a:rPr lang="en-US" smtClean="0"/>
-              <a:t>12/28/2023</a:t>
+              <a:t>1/5/2024</a:t>
             </a:fld>
             <a:endParaRPr lang="en-US"/>
           </a:p>
@@ -476,7 +476,7 @@
           <a:p>
             <a:fld id="{F09E5490-7079-428D-BA25-82A7CA4C46C9}" type="datetimeFigureOut">
               <a:rPr lang="en-US" smtClean="0"/>
-              <a:t>12/28/2023</a:t>
+              <a:t>1/5/2024</a:t>
             </a:fld>
             <a:endParaRPr lang="en-US"/>
           </a:p>
@@ -684,7 +684,7 @@
           <a:p>
             <a:fld id="{F09E5490-7079-428D-BA25-82A7CA4C46C9}" type="datetimeFigureOut">
               <a:rPr lang="en-US" smtClean="0"/>
-              <a:t>12/28/2023</a:t>
+              <a:t>1/5/2024</a:t>
             </a:fld>
             <a:endParaRPr lang="en-US"/>
           </a:p>
@@ -882,7 +882,7 @@
           <a:p>
             <a:fld id="{F09E5490-7079-428D-BA25-82A7CA4C46C9}" type="datetimeFigureOut">
               <a:rPr lang="en-US" smtClean="0"/>
-              <a:t>12/28/2023</a:t>
+              <a:t>1/5/2024</a:t>
             </a:fld>
             <a:endParaRPr lang="en-US"/>
           </a:p>
@@ -1157,7 +1157,7 @@
           <a:p>
             <a:fld id="{F09E5490-7079-428D-BA25-82A7CA4C46C9}" type="datetimeFigureOut">
               <a:rPr lang="en-US" smtClean="0"/>
-              <a:t>12/28/2023</a:t>
+              <a:t>1/5/2024</a:t>
             </a:fld>
             <a:endParaRPr lang="en-US"/>
           </a:p>
@@ -1422,7 +1422,7 @@
           <a:p>
             <a:fld id="{F09E5490-7079-428D-BA25-82A7CA4C46C9}" type="datetimeFigureOut">
               <a:rPr lang="en-US" smtClean="0"/>
-              <a:t>12/28/2023</a:t>
+              <a:t>1/5/2024</a:t>
             </a:fld>
             <a:endParaRPr lang="en-US"/>
           </a:p>
@@ -1834,7 +1834,7 @@
           <a:p>
             <a:fld id="{F09E5490-7079-428D-BA25-82A7CA4C46C9}" type="datetimeFigureOut">
               <a:rPr lang="en-US" smtClean="0"/>
-              <a:t>12/28/2023</a:t>
+              <a:t>1/5/2024</a:t>
             </a:fld>
             <a:endParaRPr lang="en-US"/>
           </a:p>
@@ -1975,7 +1975,7 @@
           <a:p>
             <a:fld id="{F09E5490-7079-428D-BA25-82A7CA4C46C9}" type="datetimeFigureOut">
               <a:rPr lang="en-US" smtClean="0"/>
-              <a:t>12/28/2023</a:t>
+              <a:t>1/5/2024</a:t>
             </a:fld>
             <a:endParaRPr lang="en-US"/>
           </a:p>
@@ -2088,7 +2088,7 @@
           <a:p>
             <a:fld id="{F09E5490-7079-428D-BA25-82A7CA4C46C9}" type="datetimeFigureOut">
               <a:rPr lang="en-US" smtClean="0"/>
-              <a:t>12/28/2023</a:t>
+              <a:t>1/5/2024</a:t>
             </a:fld>
             <a:endParaRPr lang="en-US"/>
           </a:p>
@@ -2399,7 +2399,7 @@
           <a:p>
             <a:fld id="{F09E5490-7079-428D-BA25-82A7CA4C46C9}" type="datetimeFigureOut">
               <a:rPr lang="en-US" smtClean="0"/>
-              <a:t>12/28/2023</a:t>
+              <a:t>1/5/2024</a:t>
             </a:fld>
             <a:endParaRPr lang="en-US"/>
           </a:p>
@@ -2687,7 +2687,7 @@
           <a:p>
             <a:fld id="{F09E5490-7079-428D-BA25-82A7CA4C46C9}" type="datetimeFigureOut">
               <a:rPr lang="en-US" smtClean="0"/>
-              <a:t>12/28/2023</a:t>
+              <a:t>1/5/2024</a:t>
             </a:fld>
             <a:endParaRPr lang="en-US"/>
           </a:p>
@@ -2928,7 +2928,7 @@
           <a:p>
             <a:fld id="{F09E5490-7079-428D-BA25-82A7CA4C46C9}" type="datetimeFigureOut">
               <a:rPr lang="en-US" smtClean="0"/>
-              <a:t>12/28/2023</a:t>
+              <a:t>1/5/2024</a:t>
             </a:fld>
             <a:endParaRPr lang="en-US"/>
           </a:p>
@@ -15318,6 +15318,774 @@
           </a:p>
         </p:txBody>
       </p:sp>
+      <p:sp>
+        <p:nvSpPr>
+          <p:cNvPr id="10" name="TextBox 9">
+            <a:extLst>
+              <a:ext uri="{FF2B5EF4-FFF2-40B4-BE49-F238E27FC236}">
+                <a16:creationId xmlns:a16="http://schemas.microsoft.com/office/drawing/2014/main" id="{92225489-1528-560E-04B9-E1F38F7CD072}"/>
+              </a:ext>
+            </a:extLst>
+          </p:cNvPr>
+          <p:cNvSpPr txBox="1"/>
+          <p:nvPr/>
+        </p:nvSpPr>
+        <p:spPr>
+          <a:xfrm>
+            <a:off x="0" y="420850"/>
+            <a:ext cx="2968120" cy="369332"/>
+          </a:xfrm>
+          <a:prstGeom prst="rect">
+            <a:avLst/>
+          </a:prstGeom>
+          <a:noFill/>
+        </p:spPr>
+        <p:txBody>
+          <a:bodyPr wrap="none" rtlCol="0">
+            <a:spAutoFit/>
+          </a:bodyPr>
+          <a:lstStyle/>
+          <a:p>
+            <a:r>
+              <a:rPr lang="en-US" dirty="0"/>
+              <a:t>Normal Support Conversation</a:t>
+            </a:r>
+          </a:p>
+        </p:txBody>
+      </p:sp>
+      <p:sp>
+        <p:nvSpPr>
+          <p:cNvPr id="11" name="TextBox 10">
+            <a:extLst>
+              <a:ext uri="{FF2B5EF4-FFF2-40B4-BE49-F238E27FC236}">
+                <a16:creationId xmlns:a16="http://schemas.microsoft.com/office/drawing/2014/main" id="{FB22FE62-23BB-3B57-C5D0-82E88CD46E5B}"/>
+              </a:ext>
+            </a:extLst>
+          </p:cNvPr>
+          <p:cNvSpPr txBox="1"/>
+          <p:nvPr/>
+        </p:nvSpPr>
+        <p:spPr>
+          <a:xfrm>
+            <a:off x="0" y="2912852"/>
+            <a:ext cx="4353436" cy="369332"/>
+          </a:xfrm>
+          <a:prstGeom prst="rect">
+            <a:avLst/>
+          </a:prstGeom>
+          <a:noFill/>
+        </p:spPr>
+        <p:txBody>
+          <a:bodyPr wrap="none" rtlCol="0">
+            <a:spAutoFit/>
+          </a:bodyPr>
+          <a:lstStyle/>
+          <a:p>
+            <a:r>
+              <a:rPr lang="en-US" dirty="0"/>
+              <a:t>After each pair of back &amp; forth conversation:</a:t>
+            </a:r>
+          </a:p>
+        </p:txBody>
+      </p:sp>
+      <p:pic>
+        <p:nvPicPr>
+          <p:cNvPr id="15" name="Picture 14">
+            <a:extLst>
+              <a:ext uri="{FF2B5EF4-FFF2-40B4-BE49-F238E27FC236}">
+                <a16:creationId xmlns:a16="http://schemas.microsoft.com/office/drawing/2014/main" id="{C1CBA120-EDA4-7A1D-B1AD-02CFA5816BE3}"/>
+              </a:ext>
+            </a:extLst>
+          </p:cNvPr>
+          <p:cNvPicPr>
+            <a:picLocks noChangeAspect="1"/>
+          </p:cNvPicPr>
+          <p:nvPr/>
+        </p:nvPicPr>
+        <p:blipFill>
+          <a:blip r:embed="rId2"/>
+          <a:stretch>
+            <a:fillRect/>
+          </a:stretch>
+        </p:blipFill>
+        <p:spPr>
+          <a:xfrm>
+            <a:off x="128557" y="3702808"/>
+            <a:ext cx="2048161" cy="714475"/>
+          </a:xfrm>
+          <a:prstGeom prst="rect">
+            <a:avLst/>
+          </a:prstGeom>
+        </p:spPr>
+      </p:pic>
+      <p:pic>
+        <p:nvPicPr>
+          <p:cNvPr id="17" name="Picture 16">
+            <a:extLst>
+              <a:ext uri="{FF2B5EF4-FFF2-40B4-BE49-F238E27FC236}">
+                <a16:creationId xmlns:a16="http://schemas.microsoft.com/office/drawing/2014/main" id="{A5342CF0-27BD-0485-AF0D-6EFFA46DCB03}"/>
+              </a:ext>
+            </a:extLst>
+          </p:cNvPr>
+          <p:cNvPicPr>
+            <a:picLocks noChangeAspect="1"/>
+          </p:cNvPicPr>
+          <p:nvPr/>
+        </p:nvPicPr>
+        <p:blipFill>
+          <a:blip r:embed="rId3"/>
+          <a:stretch>
+            <a:fillRect/>
+          </a:stretch>
+        </p:blipFill>
+        <p:spPr>
+          <a:xfrm>
+            <a:off x="2475023" y="3712334"/>
+            <a:ext cx="2048161" cy="704948"/>
+          </a:xfrm>
+          <a:prstGeom prst="rect">
+            <a:avLst/>
+          </a:prstGeom>
+        </p:spPr>
+      </p:pic>
+      <p:pic>
+        <p:nvPicPr>
+          <p:cNvPr id="19" name="Picture 18">
+            <a:extLst>
+              <a:ext uri="{FF2B5EF4-FFF2-40B4-BE49-F238E27FC236}">
+                <a16:creationId xmlns:a16="http://schemas.microsoft.com/office/drawing/2014/main" id="{454B80AC-669A-9314-ABCF-66690DC2FF59}"/>
+              </a:ext>
+            </a:extLst>
+          </p:cNvPr>
+          <p:cNvPicPr>
+            <a:picLocks noChangeAspect="1"/>
+          </p:cNvPicPr>
+          <p:nvPr/>
+        </p:nvPicPr>
+        <p:blipFill>
+          <a:blip r:embed="rId4"/>
+          <a:stretch>
+            <a:fillRect/>
+          </a:stretch>
+        </p:blipFill>
+        <p:spPr>
+          <a:xfrm>
+            <a:off x="4821489" y="3717097"/>
+            <a:ext cx="2067213" cy="685896"/>
+          </a:xfrm>
+          <a:prstGeom prst="rect">
+            <a:avLst/>
+          </a:prstGeom>
+        </p:spPr>
+      </p:pic>
+      <p:pic>
+        <p:nvPicPr>
+          <p:cNvPr id="21" name="Picture 20">
+            <a:extLst>
+              <a:ext uri="{FF2B5EF4-FFF2-40B4-BE49-F238E27FC236}">
+                <a16:creationId xmlns:a16="http://schemas.microsoft.com/office/drawing/2014/main" id="{E7BE05D0-8E64-0339-CD8D-737F692EDE14}"/>
+              </a:ext>
+            </a:extLst>
+          </p:cNvPr>
+          <p:cNvPicPr>
+            <a:picLocks noChangeAspect="1"/>
+          </p:cNvPicPr>
+          <p:nvPr/>
+        </p:nvPicPr>
+        <p:blipFill>
+          <a:blip r:embed="rId5"/>
+          <a:stretch>
+            <a:fillRect/>
+          </a:stretch>
+        </p:blipFill>
+        <p:spPr>
+          <a:xfrm>
+            <a:off x="7247969" y="3712334"/>
+            <a:ext cx="2048161" cy="695422"/>
+          </a:xfrm>
+          <a:prstGeom prst="rect">
+            <a:avLst/>
+          </a:prstGeom>
+        </p:spPr>
+      </p:pic>
+      <p:pic>
+        <p:nvPicPr>
+          <p:cNvPr id="23" name="Picture 22">
+            <a:extLst>
+              <a:ext uri="{FF2B5EF4-FFF2-40B4-BE49-F238E27FC236}">
+                <a16:creationId xmlns:a16="http://schemas.microsoft.com/office/drawing/2014/main" id="{4972F779-79E6-C866-3781-4F3CA9AFB030}"/>
+              </a:ext>
+            </a:extLst>
+          </p:cNvPr>
+          <p:cNvPicPr>
+            <a:picLocks noChangeAspect="1"/>
+          </p:cNvPicPr>
+          <p:nvPr/>
+        </p:nvPicPr>
+        <p:blipFill>
+          <a:blip r:embed="rId6"/>
+          <a:stretch>
+            <a:fillRect/>
+          </a:stretch>
+        </p:blipFill>
+        <p:spPr>
+          <a:xfrm>
+            <a:off x="9716977" y="3702808"/>
+            <a:ext cx="2029108" cy="685896"/>
+          </a:xfrm>
+          <a:prstGeom prst="rect">
+            <a:avLst/>
+          </a:prstGeom>
+        </p:spPr>
+      </p:pic>
+      <p:cxnSp>
+        <p:nvCxnSpPr>
+          <p:cNvPr id="25" name="Straight Arrow Connector 24">
+            <a:extLst>
+              <a:ext uri="{FF2B5EF4-FFF2-40B4-BE49-F238E27FC236}">
+                <a16:creationId xmlns:a16="http://schemas.microsoft.com/office/drawing/2014/main" id="{21C33C0E-A5CB-A63B-08F0-5F01A2D51E4F}"/>
+              </a:ext>
+            </a:extLst>
+          </p:cNvPr>
+          <p:cNvCxnSpPr>
+            <a:stCxn id="15" idx="3"/>
+            <a:endCxn id="17" idx="1"/>
+          </p:cNvCxnSpPr>
+          <p:nvPr/>
+        </p:nvCxnSpPr>
+        <p:spPr>
+          <a:xfrm>
+            <a:off x="2176718" y="4060046"/>
+            <a:ext cx="298305" cy="4762"/>
+          </a:xfrm>
+          <a:prstGeom prst="straightConnector1">
+            <a:avLst/>
+          </a:prstGeom>
+          <a:ln>
+            <a:tailEnd type="triangle"/>
+          </a:ln>
+        </p:spPr>
+        <p:style>
+          <a:lnRef idx="1">
+            <a:schemeClr val="accent1"/>
+          </a:lnRef>
+          <a:fillRef idx="0">
+            <a:schemeClr val="accent1"/>
+          </a:fillRef>
+          <a:effectRef idx="0">
+            <a:schemeClr val="accent1"/>
+          </a:effectRef>
+          <a:fontRef idx="minor">
+            <a:schemeClr val="tx1"/>
+          </a:fontRef>
+        </p:style>
+      </p:cxnSp>
+      <p:cxnSp>
+        <p:nvCxnSpPr>
+          <p:cNvPr id="27" name="Straight Arrow Connector 26">
+            <a:extLst>
+              <a:ext uri="{FF2B5EF4-FFF2-40B4-BE49-F238E27FC236}">
+                <a16:creationId xmlns:a16="http://schemas.microsoft.com/office/drawing/2014/main" id="{1B8A1030-2FB2-345F-A792-EDE947ABA52B}"/>
+              </a:ext>
+            </a:extLst>
+          </p:cNvPr>
+          <p:cNvCxnSpPr>
+            <a:stCxn id="17" idx="3"/>
+            <a:endCxn id="19" idx="1"/>
+          </p:cNvCxnSpPr>
+          <p:nvPr/>
+        </p:nvCxnSpPr>
+        <p:spPr>
+          <a:xfrm flipV="1">
+            <a:off x="4523184" y="4060045"/>
+            <a:ext cx="298305" cy="4763"/>
+          </a:xfrm>
+          <a:prstGeom prst="straightConnector1">
+            <a:avLst/>
+          </a:prstGeom>
+          <a:ln>
+            <a:tailEnd type="triangle"/>
+          </a:ln>
+        </p:spPr>
+        <p:style>
+          <a:lnRef idx="1">
+            <a:schemeClr val="accent1"/>
+          </a:lnRef>
+          <a:fillRef idx="0">
+            <a:schemeClr val="accent1"/>
+          </a:fillRef>
+          <a:effectRef idx="0">
+            <a:schemeClr val="accent1"/>
+          </a:effectRef>
+          <a:fontRef idx="minor">
+            <a:schemeClr val="tx1"/>
+          </a:fontRef>
+        </p:style>
+      </p:cxnSp>
+      <p:cxnSp>
+        <p:nvCxnSpPr>
+          <p:cNvPr id="32" name="Straight Arrow Connector 31">
+            <a:extLst>
+              <a:ext uri="{FF2B5EF4-FFF2-40B4-BE49-F238E27FC236}">
+                <a16:creationId xmlns:a16="http://schemas.microsoft.com/office/drawing/2014/main" id="{E10AC548-9D2E-A032-4CEB-A1B9229846A0}"/>
+              </a:ext>
+            </a:extLst>
+          </p:cNvPr>
+          <p:cNvCxnSpPr>
+            <a:stCxn id="19" idx="3"/>
+            <a:endCxn id="21" idx="1"/>
+          </p:cNvCxnSpPr>
+          <p:nvPr/>
+        </p:nvCxnSpPr>
+        <p:spPr>
+          <a:xfrm>
+            <a:off x="6888702" y="4060045"/>
+            <a:ext cx="359267" cy="0"/>
+          </a:xfrm>
+          <a:prstGeom prst="straightConnector1">
+            <a:avLst/>
+          </a:prstGeom>
+          <a:ln>
+            <a:tailEnd type="triangle"/>
+          </a:ln>
+        </p:spPr>
+        <p:style>
+          <a:lnRef idx="1">
+            <a:schemeClr val="accent1"/>
+          </a:lnRef>
+          <a:fillRef idx="0">
+            <a:schemeClr val="accent1"/>
+          </a:fillRef>
+          <a:effectRef idx="0">
+            <a:schemeClr val="accent1"/>
+          </a:effectRef>
+          <a:fontRef idx="minor">
+            <a:schemeClr val="tx1"/>
+          </a:fontRef>
+        </p:style>
+      </p:cxnSp>
+      <p:cxnSp>
+        <p:nvCxnSpPr>
+          <p:cNvPr id="34" name="Straight Arrow Connector 33">
+            <a:extLst>
+              <a:ext uri="{FF2B5EF4-FFF2-40B4-BE49-F238E27FC236}">
+                <a16:creationId xmlns:a16="http://schemas.microsoft.com/office/drawing/2014/main" id="{BF56FE3F-0EDA-D3BD-D259-2608934EF696}"/>
+              </a:ext>
+            </a:extLst>
+          </p:cNvPr>
+          <p:cNvCxnSpPr>
+            <a:stCxn id="21" idx="3"/>
+            <a:endCxn id="23" idx="1"/>
+          </p:cNvCxnSpPr>
+          <p:nvPr/>
+        </p:nvCxnSpPr>
+        <p:spPr>
+          <a:xfrm flipV="1">
+            <a:off x="9296130" y="4045756"/>
+            <a:ext cx="420847" cy="14289"/>
+          </a:xfrm>
+          <a:prstGeom prst="straightConnector1">
+            <a:avLst/>
+          </a:prstGeom>
+          <a:ln>
+            <a:tailEnd type="triangle"/>
+          </a:ln>
+        </p:spPr>
+        <p:style>
+          <a:lnRef idx="1">
+            <a:schemeClr val="accent1"/>
+          </a:lnRef>
+          <a:fillRef idx="0">
+            <a:schemeClr val="accent1"/>
+          </a:fillRef>
+          <a:effectRef idx="0">
+            <a:schemeClr val="accent1"/>
+          </a:effectRef>
+          <a:fontRef idx="minor">
+            <a:schemeClr val="tx1"/>
+          </a:fontRef>
+        </p:style>
+      </p:cxnSp>
+      <p:sp>
+        <p:nvSpPr>
+          <p:cNvPr id="35" name="TextBox 34">
+            <a:extLst>
+              <a:ext uri="{FF2B5EF4-FFF2-40B4-BE49-F238E27FC236}">
+                <a16:creationId xmlns:a16="http://schemas.microsoft.com/office/drawing/2014/main" id="{E01031D3-A6A7-A62B-BAA3-47D4B842E1B4}"/>
+              </a:ext>
+            </a:extLst>
+          </p:cNvPr>
+          <p:cNvSpPr txBox="1"/>
+          <p:nvPr/>
+        </p:nvSpPr>
+        <p:spPr>
+          <a:xfrm>
+            <a:off x="718020" y="3391151"/>
+            <a:ext cx="881844" cy="369332"/>
+          </a:xfrm>
+          <a:prstGeom prst="rect">
+            <a:avLst/>
+          </a:prstGeom>
+          <a:noFill/>
+        </p:spPr>
+        <p:txBody>
+          <a:bodyPr wrap="none" rtlCol="0">
+            <a:spAutoFit/>
+          </a:bodyPr>
+          <a:lstStyle/>
+          <a:p>
+            <a:r>
+              <a:rPr lang="en-US" dirty="0"/>
+              <a:t>Batch 1</a:t>
+            </a:r>
+          </a:p>
+        </p:txBody>
+      </p:sp>
+      <p:sp>
+        <p:nvSpPr>
+          <p:cNvPr id="36" name="TextBox 35">
+            <a:extLst>
+              <a:ext uri="{FF2B5EF4-FFF2-40B4-BE49-F238E27FC236}">
+                <a16:creationId xmlns:a16="http://schemas.microsoft.com/office/drawing/2014/main" id="{FCF9763F-BF68-DB13-1CEE-9D62A91AC1B2}"/>
+              </a:ext>
+            </a:extLst>
+          </p:cNvPr>
+          <p:cNvSpPr txBox="1"/>
+          <p:nvPr/>
+        </p:nvSpPr>
+        <p:spPr>
+          <a:xfrm>
+            <a:off x="3098188" y="3391151"/>
+            <a:ext cx="881844" cy="369332"/>
+          </a:xfrm>
+          <a:prstGeom prst="rect">
+            <a:avLst/>
+          </a:prstGeom>
+          <a:noFill/>
+        </p:spPr>
+        <p:txBody>
+          <a:bodyPr wrap="none" rtlCol="0">
+            <a:spAutoFit/>
+          </a:bodyPr>
+          <a:lstStyle/>
+          <a:p>
+            <a:r>
+              <a:rPr lang="en-US" dirty="0"/>
+              <a:t>Batch 2</a:t>
+            </a:r>
+          </a:p>
+        </p:txBody>
+      </p:sp>
+      <p:sp>
+        <p:nvSpPr>
+          <p:cNvPr id="37" name="TextBox 36">
+            <a:extLst>
+              <a:ext uri="{FF2B5EF4-FFF2-40B4-BE49-F238E27FC236}">
+                <a16:creationId xmlns:a16="http://schemas.microsoft.com/office/drawing/2014/main" id="{AEF6A4D9-3101-67AD-3530-9D07206305C5}"/>
+              </a:ext>
+            </a:extLst>
+          </p:cNvPr>
+          <p:cNvSpPr txBox="1"/>
+          <p:nvPr/>
+        </p:nvSpPr>
+        <p:spPr>
+          <a:xfrm>
+            <a:off x="5478356" y="3351875"/>
+            <a:ext cx="881844" cy="369332"/>
+          </a:xfrm>
+          <a:prstGeom prst="rect">
+            <a:avLst/>
+          </a:prstGeom>
+          <a:noFill/>
+        </p:spPr>
+        <p:txBody>
+          <a:bodyPr wrap="none" rtlCol="0">
+            <a:spAutoFit/>
+          </a:bodyPr>
+          <a:lstStyle/>
+          <a:p>
+            <a:r>
+              <a:rPr lang="en-US" dirty="0"/>
+              <a:t>Batch 3</a:t>
+            </a:r>
+          </a:p>
+        </p:txBody>
+      </p:sp>
+      <p:sp>
+        <p:nvSpPr>
+          <p:cNvPr id="38" name="TextBox 37">
+            <a:extLst>
+              <a:ext uri="{FF2B5EF4-FFF2-40B4-BE49-F238E27FC236}">
+                <a16:creationId xmlns:a16="http://schemas.microsoft.com/office/drawing/2014/main" id="{4EE8FA4C-CD9E-0452-3765-E82802B84778}"/>
+              </a:ext>
+            </a:extLst>
+          </p:cNvPr>
+          <p:cNvSpPr txBox="1"/>
+          <p:nvPr/>
+        </p:nvSpPr>
+        <p:spPr>
+          <a:xfrm>
+            <a:off x="7912277" y="3351875"/>
+            <a:ext cx="881844" cy="369332"/>
+          </a:xfrm>
+          <a:prstGeom prst="rect">
+            <a:avLst/>
+          </a:prstGeom>
+          <a:noFill/>
+        </p:spPr>
+        <p:txBody>
+          <a:bodyPr wrap="none" rtlCol="0">
+            <a:spAutoFit/>
+          </a:bodyPr>
+          <a:lstStyle/>
+          <a:p>
+            <a:r>
+              <a:rPr lang="en-US" dirty="0"/>
+              <a:t>Batch 4</a:t>
+            </a:r>
+          </a:p>
+        </p:txBody>
+      </p:sp>
+      <p:sp>
+        <p:nvSpPr>
+          <p:cNvPr id="39" name="TextBox 38">
+            <a:extLst>
+              <a:ext uri="{FF2B5EF4-FFF2-40B4-BE49-F238E27FC236}">
+                <a16:creationId xmlns:a16="http://schemas.microsoft.com/office/drawing/2014/main" id="{FA6ABDFD-8FB1-C14F-706A-53E3C6481937}"/>
+              </a:ext>
+            </a:extLst>
+          </p:cNvPr>
+          <p:cNvSpPr txBox="1"/>
+          <p:nvPr/>
+        </p:nvSpPr>
+        <p:spPr>
+          <a:xfrm>
+            <a:off x="10358074" y="3342460"/>
+            <a:ext cx="881844" cy="369332"/>
+          </a:xfrm>
+          <a:prstGeom prst="rect">
+            <a:avLst/>
+          </a:prstGeom>
+          <a:noFill/>
+        </p:spPr>
+        <p:txBody>
+          <a:bodyPr wrap="none" rtlCol="0">
+            <a:spAutoFit/>
+          </a:bodyPr>
+          <a:lstStyle/>
+          <a:p>
+            <a:r>
+              <a:rPr lang="en-US" dirty="0"/>
+              <a:t>Batch 5</a:t>
+            </a:r>
+          </a:p>
+        </p:txBody>
+      </p:sp>
+      <p:sp>
+        <p:nvSpPr>
+          <p:cNvPr id="42" name="TextBox 41">
+            <a:extLst>
+              <a:ext uri="{FF2B5EF4-FFF2-40B4-BE49-F238E27FC236}">
+                <a16:creationId xmlns:a16="http://schemas.microsoft.com/office/drawing/2014/main" id="{E0B36B63-349D-CDE4-7E6E-14237B403D6B}"/>
+              </a:ext>
+            </a:extLst>
+          </p:cNvPr>
+          <p:cNvSpPr txBox="1"/>
+          <p:nvPr/>
+        </p:nvSpPr>
+        <p:spPr>
+          <a:xfrm>
+            <a:off x="348635" y="4417282"/>
+            <a:ext cx="1608004" cy="461665"/>
+          </a:xfrm>
+          <a:prstGeom prst="rect">
+            <a:avLst/>
+          </a:prstGeom>
+          <a:noFill/>
+        </p:spPr>
+        <p:txBody>
+          <a:bodyPr wrap="none" rtlCol="0">
+            <a:spAutoFit/>
+          </a:bodyPr>
+          <a:lstStyle/>
+          <a:p>
+            <a:r>
+              <a:rPr lang="en-US" sz="1200" dirty="0"/>
+              <a:t>Prediction: Not a Scam</a:t>
+            </a:r>
+          </a:p>
+          <a:p>
+            <a:r>
+              <a:rPr lang="en-US" sz="1200" dirty="0"/>
+              <a:t>Probability: 83%</a:t>
+            </a:r>
+          </a:p>
+        </p:txBody>
+      </p:sp>
+      <p:sp>
+        <p:nvSpPr>
+          <p:cNvPr id="43" name="TextBox 42">
+            <a:extLst>
+              <a:ext uri="{FF2B5EF4-FFF2-40B4-BE49-F238E27FC236}">
+                <a16:creationId xmlns:a16="http://schemas.microsoft.com/office/drawing/2014/main" id="{1309E7C8-129C-721D-36F6-B4DB050BA572}"/>
+              </a:ext>
+            </a:extLst>
+          </p:cNvPr>
+          <p:cNvSpPr txBox="1"/>
+          <p:nvPr/>
+        </p:nvSpPr>
+        <p:spPr>
+          <a:xfrm>
+            <a:off x="2695101" y="4417282"/>
+            <a:ext cx="1608004" cy="461665"/>
+          </a:xfrm>
+          <a:prstGeom prst="rect">
+            <a:avLst/>
+          </a:prstGeom>
+          <a:noFill/>
+        </p:spPr>
+        <p:txBody>
+          <a:bodyPr wrap="none" rtlCol="0">
+            <a:spAutoFit/>
+          </a:bodyPr>
+          <a:lstStyle/>
+          <a:p>
+            <a:r>
+              <a:rPr lang="en-US" sz="1200" dirty="0"/>
+              <a:t>Prediction: Not a Scam</a:t>
+            </a:r>
+          </a:p>
+          <a:p>
+            <a:r>
+              <a:rPr lang="en-US" sz="1200" dirty="0"/>
+              <a:t>Probability: 80%</a:t>
+            </a:r>
+          </a:p>
+        </p:txBody>
+      </p:sp>
+      <p:sp>
+        <p:nvSpPr>
+          <p:cNvPr id="44" name="TextBox 43">
+            <a:extLst>
+              <a:ext uri="{FF2B5EF4-FFF2-40B4-BE49-F238E27FC236}">
+                <a16:creationId xmlns:a16="http://schemas.microsoft.com/office/drawing/2014/main" id="{E8FA399B-E914-3CEE-5459-E96BB6CEF37D}"/>
+              </a:ext>
+            </a:extLst>
+          </p:cNvPr>
+          <p:cNvSpPr txBox="1"/>
+          <p:nvPr/>
+        </p:nvSpPr>
+        <p:spPr>
+          <a:xfrm>
+            <a:off x="5041567" y="4417281"/>
+            <a:ext cx="1608004" cy="461665"/>
+          </a:xfrm>
+          <a:prstGeom prst="rect">
+            <a:avLst/>
+          </a:prstGeom>
+          <a:noFill/>
+        </p:spPr>
+        <p:txBody>
+          <a:bodyPr wrap="none" rtlCol="0">
+            <a:spAutoFit/>
+          </a:bodyPr>
+          <a:lstStyle/>
+          <a:p>
+            <a:r>
+              <a:rPr lang="en-US" sz="1200" dirty="0"/>
+              <a:t>Prediction: Not a Scam</a:t>
+            </a:r>
+          </a:p>
+          <a:p>
+            <a:r>
+              <a:rPr lang="en-US" sz="1200" dirty="0"/>
+              <a:t>Probability: 81%</a:t>
+            </a:r>
+          </a:p>
+        </p:txBody>
+      </p:sp>
+      <p:sp>
+        <p:nvSpPr>
+          <p:cNvPr id="45" name="TextBox 44">
+            <a:extLst>
+              <a:ext uri="{FF2B5EF4-FFF2-40B4-BE49-F238E27FC236}">
+                <a16:creationId xmlns:a16="http://schemas.microsoft.com/office/drawing/2014/main" id="{FA93AD54-9C4B-465F-BF86-F940898C7B66}"/>
+              </a:ext>
+            </a:extLst>
+          </p:cNvPr>
+          <p:cNvSpPr txBox="1"/>
+          <p:nvPr/>
+        </p:nvSpPr>
+        <p:spPr>
+          <a:xfrm>
+            <a:off x="7468047" y="4427603"/>
+            <a:ext cx="1608004" cy="461665"/>
+          </a:xfrm>
+          <a:prstGeom prst="rect">
+            <a:avLst/>
+          </a:prstGeom>
+          <a:noFill/>
+        </p:spPr>
+        <p:txBody>
+          <a:bodyPr wrap="none" rtlCol="0">
+            <a:spAutoFit/>
+          </a:bodyPr>
+          <a:lstStyle/>
+          <a:p>
+            <a:r>
+              <a:rPr lang="en-US" sz="1200" dirty="0"/>
+              <a:t>Prediction: Not a Scam</a:t>
+            </a:r>
+          </a:p>
+          <a:p>
+            <a:r>
+              <a:rPr lang="en-US" sz="1200" dirty="0"/>
+              <a:t>Probability: 82%</a:t>
+            </a:r>
+          </a:p>
+        </p:txBody>
+      </p:sp>
+      <p:sp>
+        <p:nvSpPr>
+          <p:cNvPr id="46" name="TextBox 45">
+            <a:extLst>
+              <a:ext uri="{FF2B5EF4-FFF2-40B4-BE49-F238E27FC236}">
+                <a16:creationId xmlns:a16="http://schemas.microsoft.com/office/drawing/2014/main" id="{9E577945-ABD9-55FC-9AF0-94399DD7AF9C}"/>
+              </a:ext>
+            </a:extLst>
+          </p:cNvPr>
+          <p:cNvSpPr txBox="1"/>
+          <p:nvPr/>
+        </p:nvSpPr>
+        <p:spPr>
+          <a:xfrm>
+            <a:off x="9927529" y="4388704"/>
+            <a:ext cx="1608004" cy="461665"/>
+          </a:xfrm>
+          <a:prstGeom prst="rect">
+            <a:avLst/>
+          </a:prstGeom>
+          <a:noFill/>
+        </p:spPr>
+        <p:txBody>
+          <a:bodyPr wrap="none" rtlCol="0">
+            <a:spAutoFit/>
+          </a:bodyPr>
+          <a:lstStyle/>
+          <a:p>
+            <a:r>
+              <a:rPr lang="en-US" sz="1200" dirty="0"/>
+              <a:t>Prediction: Not a Scam</a:t>
+            </a:r>
+          </a:p>
+          <a:p>
+            <a:r>
+              <a:rPr lang="en-US" sz="1200" dirty="0"/>
+              <a:t>Probability: 80%</a:t>
+            </a:r>
+          </a:p>
+        </p:txBody>
+      </p:sp>
       <p:graphicFrame>
         <p:nvGraphicFramePr>
           <p:cNvPr id="7" name="Table 6">
@@ -15333,7 +16101,7 @@
           <p:nvPr>
             <p:extLst>
               <p:ext uri="{D42A27DB-BD31-4B8C-83A1-F6EECF244321}">
-                <p14:modId xmlns:p14="http://schemas.microsoft.com/office/powerpoint/2010/main" val="3888186517"/>
+                <p14:modId xmlns:p14="http://schemas.microsoft.com/office/powerpoint/2010/main" val="1417846980"/>
               </p:ext>
             </p:extLst>
           </p:nvPr>
@@ -15356,14 +16124,14 @@
                     </a:ext>
                   </a:extLst>
                 </a:gridCol>
-                <a:gridCol w="5954710">
+                <a:gridCol w="5262363">
                   <a:extLst>
                     <a:ext uri="{9D8B030D-6E8A-4147-A177-3AD203B41FA5}">
                       <a16:colId xmlns:a16="http://schemas.microsoft.com/office/drawing/2014/main" val="3523283076"/>
                     </a:ext>
                   </a:extLst>
                 </a:gridCol>
-                <a:gridCol w="4794053">
+                <a:gridCol w="5486400">
                   <a:extLst>
                     <a:ext uri="{9D8B030D-6E8A-4147-A177-3AD203B41FA5}">
                       <a16:colId xmlns:a16="http://schemas.microsoft.com/office/drawing/2014/main" val="1026576332"/>
@@ -15395,18 +16163,13 @@
                     <a:lstStyle/>
                     <a:p>
                       <a:r>
-                        <a:rPr lang="en-US" sz="1000">
+                        <a:rPr lang="en-US" sz="1000" dirty="0">
                           <a:solidFill>
                             <a:schemeClr val="tx1"/>
                           </a:solidFill>
                         </a:rPr>
                         <a:t>Attacker_Helper</a:t>
                       </a:r>
-                      <a:endParaRPr lang="en-US" sz="1000" dirty="0">
-                        <a:solidFill>
-                          <a:schemeClr val="tx1"/>
-                        </a:solidFill>
-                      </a:endParaRPr>
                     </a:p>
                   </a:txBody>
                   <a:tcPr/>
@@ -15818,774 +16581,6 @@
           </a:graphicData>
         </a:graphic>
       </p:graphicFrame>
-      <p:sp>
-        <p:nvSpPr>
-          <p:cNvPr id="10" name="TextBox 9">
-            <a:extLst>
-              <a:ext uri="{FF2B5EF4-FFF2-40B4-BE49-F238E27FC236}">
-                <a16:creationId xmlns:a16="http://schemas.microsoft.com/office/drawing/2014/main" id="{92225489-1528-560E-04B9-E1F38F7CD072}"/>
-              </a:ext>
-            </a:extLst>
-          </p:cNvPr>
-          <p:cNvSpPr txBox="1"/>
-          <p:nvPr/>
-        </p:nvSpPr>
-        <p:spPr>
-          <a:xfrm>
-            <a:off x="0" y="420850"/>
-            <a:ext cx="2968120" cy="369332"/>
-          </a:xfrm>
-          <a:prstGeom prst="rect">
-            <a:avLst/>
-          </a:prstGeom>
-          <a:noFill/>
-        </p:spPr>
-        <p:txBody>
-          <a:bodyPr wrap="none" rtlCol="0">
-            <a:spAutoFit/>
-          </a:bodyPr>
-          <a:lstStyle/>
-          <a:p>
-            <a:r>
-              <a:rPr lang="en-US" dirty="0"/>
-              <a:t>Normal Support Conversation</a:t>
-            </a:r>
-          </a:p>
-        </p:txBody>
-      </p:sp>
-      <p:sp>
-        <p:nvSpPr>
-          <p:cNvPr id="11" name="TextBox 10">
-            <a:extLst>
-              <a:ext uri="{FF2B5EF4-FFF2-40B4-BE49-F238E27FC236}">
-                <a16:creationId xmlns:a16="http://schemas.microsoft.com/office/drawing/2014/main" id="{FB22FE62-23BB-3B57-C5D0-82E88CD46E5B}"/>
-              </a:ext>
-            </a:extLst>
-          </p:cNvPr>
-          <p:cNvSpPr txBox="1"/>
-          <p:nvPr/>
-        </p:nvSpPr>
-        <p:spPr>
-          <a:xfrm>
-            <a:off x="0" y="2912852"/>
-            <a:ext cx="4353436" cy="369332"/>
-          </a:xfrm>
-          <a:prstGeom prst="rect">
-            <a:avLst/>
-          </a:prstGeom>
-          <a:noFill/>
-        </p:spPr>
-        <p:txBody>
-          <a:bodyPr wrap="none" rtlCol="0">
-            <a:spAutoFit/>
-          </a:bodyPr>
-          <a:lstStyle/>
-          <a:p>
-            <a:r>
-              <a:rPr lang="en-US" dirty="0"/>
-              <a:t>After each pair of back &amp; forth conversation:</a:t>
-            </a:r>
-          </a:p>
-        </p:txBody>
-      </p:sp>
-      <p:pic>
-        <p:nvPicPr>
-          <p:cNvPr id="15" name="Picture 14">
-            <a:extLst>
-              <a:ext uri="{FF2B5EF4-FFF2-40B4-BE49-F238E27FC236}">
-                <a16:creationId xmlns:a16="http://schemas.microsoft.com/office/drawing/2014/main" id="{C1CBA120-EDA4-7A1D-B1AD-02CFA5816BE3}"/>
-              </a:ext>
-            </a:extLst>
-          </p:cNvPr>
-          <p:cNvPicPr>
-            <a:picLocks noChangeAspect="1"/>
-          </p:cNvPicPr>
-          <p:nvPr/>
-        </p:nvPicPr>
-        <p:blipFill>
-          <a:blip r:embed="rId2"/>
-          <a:stretch>
-            <a:fillRect/>
-          </a:stretch>
-        </p:blipFill>
-        <p:spPr>
-          <a:xfrm>
-            <a:off x="128557" y="3702808"/>
-            <a:ext cx="2048161" cy="714475"/>
-          </a:xfrm>
-          <a:prstGeom prst="rect">
-            <a:avLst/>
-          </a:prstGeom>
-        </p:spPr>
-      </p:pic>
-      <p:pic>
-        <p:nvPicPr>
-          <p:cNvPr id="17" name="Picture 16">
-            <a:extLst>
-              <a:ext uri="{FF2B5EF4-FFF2-40B4-BE49-F238E27FC236}">
-                <a16:creationId xmlns:a16="http://schemas.microsoft.com/office/drawing/2014/main" id="{A5342CF0-27BD-0485-AF0D-6EFFA46DCB03}"/>
-              </a:ext>
-            </a:extLst>
-          </p:cNvPr>
-          <p:cNvPicPr>
-            <a:picLocks noChangeAspect="1"/>
-          </p:cNvPicPr>
-          <p:nvPr/>
-        </p:nvPicPr>
-        <p:blipFill>
-          <a:blip r:embed="rId3"/>
-          <a:stretch>
-            <a:fillRect/>
-          </a:stretch>
-        </p:blipFill>
-        <p:spPr>
-          <a:xfrm>
-            <a:off x="2475023" y="3712334"/>
-            <a:ext cx="2048161" cy="704948"/>
-          </a:xfrm>
-          <a:prstGeom prst="rect">
-            <a:avLst/>
-          </a:prstGeom>
-        </p:spPr>
-      </p:pic>
-      <p:pic>
-        <p:nvPicPr>
-          <p:cNvPr id="19" name="Picture 18">
-            <a:extLst>
-              <a:ext uri="{FF2B5EF4-FFF2-40B4-BE49-F238E27FC236}">
-                <a16:creationId xmlns:a16="http://schemas.microsoft.com/office/drawing/2014/main" id="{454B80AC-669A-9314-ABCF-66690DC2FF59}"/>
-              </a:ext>
-            </a:extLst>
-          </p:cNvPr>
-          <p:cNvPicPr>
-            <a:picLocks noChangeAspect="1"/>
-          </p:cNvPicPr>
-          <p:nvPr/>
-        </p:nvPicPr>
-        <p:blipFill>
-          <a:blip r:embed="rId4"/>
-          <a:stretch>
-            <a:fillRect/>
-          </a:stretch>
-        </p:blipFill>
-        <p:spPr>
-          <a:xfrm>
-            <a:off x="4821489" y="3717097"/>
-            <a:ext cx="2067213" cy="685896"/>
-          </a:xfrm>
-          <a:prstGeom prst="rect">
-            <a:avLst/>
-          </a:prstGeom>
-        </p:spPr>
-      </p:pic>
-      <p:pic>
-        <p:nvPicPr>
-          <p:cNvPr id="21" name="Picture 20">
-            <a:extLst>
-              <a:ext uri="{FF2B5EF4-FFF2-40B4-BE49-F238E27FC236}">
-                <a16:creationId xmlns:a16="http://schemas.microsoft.com/office/drawing/2014/main" id="{E7BE05D0-8E64-0339-CD8D-737F692EDE14}"/>
-              </a:ext>
-            </a:extLst>
-          </p:cNvPr>
-          <p:cNvPicPr>
-            <a:picLocks noChangeAspect="1"/>
-          </p:cNvPicPr>
-          <p:nvPr/>
-        </p:nvPicPr>
-        <p:blipFill>
-          <a:blip r:embed="rId5"/>
-          <a:stretch>
-            <a:fillRect/>
-          </a:stretch>
-        </p:blipFill>
-        <p:spPr>
-          <a:xfrm>
-            <a:off x="7247969" y="3712334"/>
-            <a:ext cx="2048161" cy="695422"/>
-          </a:xfrm>
-          <a:prstGeom prst="rect">
-            <a:avLst/>
-          </a:prstGeom>
-        </p:spPr>
-      </p:pic>
-      <p:pic>
-        <p:nvPicPr>
-          <p:cNvPr id="23" name="Picture 22">
-            <a:extLst>
-              <a:ext uri="{FF2B5EF4-FFF2-40B4-BE49-F238E27FC236}">
-                <a16:creationId xmlns:a16="http://schemas.microsoft.com/office/drawing/2014/main" id="{4972F779-79E6-C866-3781-4F3CA9AFB030}"/>
-              </a:ext>
-            </a:extLst>
-          </p:cNvPr>
-          <p:cNvPicPr>
-            <a:picLocks noChangeAspect="1"/>
-          </p:cNvPicPr>
-          <p:nvPr/>
-        </p:nvPicPr>
-        <p:blipFill>
-          <a:blip r:embed="rId6"/>
-          <a:stretch>
-            <a:fillRect/>
-          </a:stretch>
-        </p:blipFill>
-        <p:spPr>
-          <a:xfrm>
-            <a:off x="9716977" y="3702808"/>
-            <a:ext cx="2029108" cy="685896"/>
-          </a:xfrm>
-          <a:prstGeom prst="rect">
-            <a:avLst/>
-          </a:prstGeom>
-        </p:spPr>
-      </p:pic>
-      <p:cxnSp>
-        <p:nvCxnSpPr>
-          <p:cNvPr id="25" name="Straight Arrow Connector 24">
-            <a:extLst>
-              <a:ext uri="{FF2B5EF4-FFF2-40B4-BE49-F238E27FC236}">
-                <a16:creationId xmlns:a16="http://schemas.microsoft.com/office/drawing/2014/main" id="{21C33C0E-A5CB-A63B-08F0-5F01A2D51E4F}"/>
-              </a:ext>
-            </a:extLst>
-          </p:cNvPr>
-          <p:cNvCxnSpPr>
-            <a:stCxn id="15" idx="3"/>
-            <a:endCxn id="17" idx="1"/>
-          </p:cNvCxnSpPr>
-          <p:nvPr/>
-        </p:nvCxnSpPr>
-        <p:spPr>
-          <a:xfrm>
-            <a:off x="2176718" y="4060046"/>
-            <a:ext cx="298305" cy="4762"/>
-          </a:xfrm>
-          <a:prstGeom prst="straightConnector1">
-            <a:avLst/>
-          </a:prstGeom>
-          <a:ln>
-            <a:tailEnd type="triangle"/>
-          </a:ln>
-        </p:spPr>
-        <p:style>
-          <a:lnRef idx="1">
-            <a:schemeClr val="accent1"/>
-          </a:lnRef>
-          <a:fillRef idx="0">
-            <a:schemeClr val="accent1"/>
-          </a:fillRef>
-          <a:effectRef idx="0">
-            <a:schemeClr val="accent1"/>
-          </a:effectRef>
-          <a:fontRef idx="minor">
-            <a:schemeClr val="tx1"/>
-          </a:fontRef>
-        </p:style>
-      </p:cxnSp>
-      <p:cxnSp>
-        <p:nvCxnSpPr>
-          <p:cNvPr id="27" name="Straight Arrow Connector 26">
-            <a:extLst>
-              <a:ext uri="{FF2B5EF4-FFF2-40B4-BE49-F238E27FC236}">
-                <a16:creationId xmlns:a16="http://schemas.microsoft.com/office/drawing/2014/main" id="{1B8A1030-2FB2-345F-A792-EDE947ABA52B}"/>
-              </a:ext>
-            </a:extLst>
-          </p:cNvPr>
-          <p:cNvCxnSpPr>
-            <a:stCxn id="17" idx="3"/>
-            <a:endCxn id="19" idx="1"/>
-          </p:cNvCxnSpPr>
-          <p:nvPr/>
-        </p:nvCxnSpPr>
-        <p:spPr>
-          <a:xfrm flipV="1">
-            <a:off x="4523184" y="4060045"/>
-            <a:ext cx="298305" cy="4763"/>
-          </a:xfrm>
-          <a:prstGeom prst="straightConnector1">
-            <a:avLst/>
-          </a:prstGeom>
-          <a:ln>
-            <a:tailEnd type="triangle"/>
-          </a:ln>
-        </p:spPr>
-        <p:style>
-          <a:lnRef idx="1">
-            <a:schemeClr val="accent1"/>
-          </a:lnRef>
-          <a:fillRef idx="0">
-            <a:schemeClr val="accent1"/>
-          </a:fillRef>
-          <a:effectRef idx="0">
-            <a:schemeClr val="accent1"/>
-          </a:effectRef>
-          <a:fontRef idx="minor">
-            <a:schemeClr val="tx1"/>
-          </a:fontRef>
-        </p:style>
-      </p:cxnSp>
-      <p:cxnSp>
-        <p:nvCxnSpPr>
-          <p:cNvPr id="32" name="Straight Arrow Connector 31">
-            <a:extLst>
-              <a:ext uri="{FF2B5EF4-FFF2-40B4-BE49-F238E27FC236}">
-                <a16:creationId xmlns:a16="http://schemas.microsoft.com/office/drawing/2014/main" id="{E10AC548-9D2E-A032-4CEB-A1B9229846A0}"/>
-              </a:ext>
-            </a:extLst>
-          </p:cNvPr>
-          <p:cNvCxnSpPr>
-            <a:stCxn id="19" idx="3"/>
-            <a:endCxn id="21" idx="1"/>
-          </p:cNvCxnSpPr>
-          <p:nvPr/>
-        </p:nvCxnSpPr>
-        <p:spPr>
-          <a:xfrm>
-            <a:off x="6888702" y="4060045"/>
-            <a:ext cx="359267" cy="0"/>
-          </a:xfrm>
-          <a:prstGeom prst="straightConnector1">
-            <a:avLst/>
-          </a:prstGeom>
-          <a:ln>
-            <a:tailEnd type="triangle"/>
-          </a:ln>
-        </p:spPr>
-        <p:style>
-          <a:lnRef idx="1">
-            <a:schemeClr val="accent1"/>
-          </a:lnRef>
-          <a:fillRef idx="0">
-            <a:schemeClr val="accent1"/>
-          </a:fillRef>
-          <a:effectRef idx="0">
-            <a:schemeClr val="accent1"/>
-          </a:effectRef>
-          <a:fontRef idx="minor">
-            <a:schemeClr val="tx1"/>
-          </a:fontRef>
-        </p:style>
-      </p:cxnSp>
-      <p:cxnSp>
-        <p:nvCxnSpPr>
-          <p:cNvPr id="34" name="Straight Arrow Connector 33">
-            <a:extLst>
-              <a:ext uri="{FF2B5EF4-FFF2-40B4-BE49-F238E27FC236}">
-                <a16:creationId xmlns:a16="http://schemas.microsoft.com/office/drawing/2014/main" id="{BF56FE3F-0EDA-D3BD-D259-2608934EF696}"/>
-              </a:ext>
-            </a:extLst>
-          </p:cNvPr>
-          <p:cNvCxnSpPr>
-            <a:stCxn id="21" idx="3"/>
-            <a:endCxn id="23" idx="1"/>
-          </p:cNvCxnSpPr>
-          <p:nvPr/>
-        </p:nvCxnSpPr>
-        <p:spPr>
-          <a:xfrm flipV="1">
-            <a:off x="9296130" y="4045756"/>
-            <a:ext cx="420847" cy="14289"/>
-          </a:xfrm>
-          <a:prstGeom prst="straightConnector1">
-            <a:avLst/>
-          </a:prstGeom>
-          <a:ln>
-            <a:tailEnd type="triangle"/>
-          </a:ln>
-        </p:spPr>
-        <p:style>
-          <a:lnRef idx="1">
-            <a:schemeClr val="accent1"/>
-          </a:lnRef>
-          <a:fillRef idx="0">
-            <a:schemeClr val="accent1"/>
-          </a:fillRef>
-          <a:effectRef idx="0">
-            <a:schemeClr val="accent1"/>
-          </a:effectRef>
-          <a:fontRef idx="minor">
-            <a:schemeClr val="tx1"/>
-          </a:fontRef>
-        </p:style>
-      </p:cxnSp>
-      <p:sp>
-        <p:nvSpPr>
-          <p:cNvPr id="35" name="TextBox 34">
-            <a:extLst>
-              <a:ext uri="{FF2B5EF4-FFF2-40B4-BE49-F238E27FC236}">
-                <a16:creationId xmlns:a16="http://schemas.microsoft.com/office/drawing/2014/main" id="{E01031D3-A6A7-A62B-BAA3-47D4B842E1B4}"/>
-              </a:ext>
-            </a:extLst>
-          </p:cNvPr>
-          <p:cNvSpPr txBox="1"/>
-          <p:nvPr/>
-        </p:nvSpPr>
-        <p:spPr>
-          <a:xfrm>
-            <a:off x="718020" y="3391151"/>
-            <a:ext cx="881844" cy="369332"/>
-          </a:xfrm>
-          <a:prstGeom prst="rect">
-            <a:avLst/>
-          </a:prstGeom>
-          <a:noFill/>
-        </p:spPr>
-        <p:txBody>
-          <a:bodyPr wrap="none" rtlCol="0">
-            <a:spAutoFit/>
-          </a:bodyPr>
-          <a:lstStyle/>
-          <a:p>
-            <a:r>
-              <a:rPr lang="en-US" dirty="0"/>
-              <a:t>Batch 1</a:t>
-            </a:r>
-          </a:p>
-        </p:txBody>
-      </p:sp>
-      <p:sp>
-        <p:nvSpPr>
-          <p:cNvPr id="36" name="TextBox 35">
-            <a:extLst>
-              <a:ext uri="{FF2B5EF4-FFF2-40B4-BE49-F238E27FC236}">
-                <a16:creationId xmlns:a16="http://schemas.microsoft.com/office/drawing/2014/main" id="{FCF9763F-BF68-DB13-1CEE-9D62A91AC1B2}"/>
-              </a:ext>
-            </a:extLst>
-          </p:cNvPr>
-          <p:cNvSpPr txBox="1"/>
-          <p:nvPr/>
-        </p:nvSpPr>
-        <p:spPr>
-          <a:xfrm>
-            <a:off x="3098188" y="3391151"/>
-            <a:ext cx="881844" cy="369332"/>
-          </a:xfrm>
-          <a:prstGeom prst="rect">
-            <a:avLst/>
-          </a:prstGeom>
-          <a:noFill/>
-        </p:spPr>
-        <p:txBody>
-          <a:bodyPr wrap="none" rtlCol="0">
-            <a:spAutoFit/>
-          </a:bodyPr>
-          <a:lstStyle/>
-          <a:p>
-            <a:r>
-              <a:rPr lang="en-US" dirty="0"/>
-              <a:t>Batch 2</a:t>
-            </a:r>
-          </a:p>
-        </p:txBody>
-      </p:sp>
-      <p:sp>
-        <p:nvSpPr>
-          <p:cNvPr id="37" name="TextBox 36">
-            <a:extLst>
-              <a:ext uri="{FF2B5EF4-FFF2-40B4-BE49-F238E27FC236}">
-                <a16:creationId xmlns:a16="http://schemas.microsoft.com/office/drawing/2014/main" id="{AEF6A4D9-3101-67AD-3530-9D07206305C5}"/>
-              </a:ext>
-            </a:extLst>
-          </p:cNvPr>
-          <p:cNvSpPr txBox="1"/>
-          <p:nvPr/>
-        </p:nvSpPr>
-        <p:spPr>
-          <a:xfrm>
-            <a:off x="5478356" y="3351875"/>
-            <a:ext cx="881844" cy="369332"/>
-          </a:xfrm>
-          <a:prstGeom prst="rect">
-            <a:avLst/>
-          </a:prstGeom>
-          <a:noFill/>
-        </p:spPr>
-        <p:txBody>
-          <a:bodyPr wrap="none" rtlCol="0">
-            <a:spAutoFit/>
-          </a:bodyPr>
-          <a:lstStyle/>
-          <a:p>
-            <a:r>
-              <a:rPr lang="en-US" dirty="0"/>
-              <a:t>Batch 3</a:t>
-            </a:r>
-          </a:p>
-        </p:txBody>
-      </p:sp>
-      <p:sp>
-        <p:nvSpPr>
-          <p:cNvPr id="38" name="TextBox 37">
-            <a:extLst>
-              <a:ext uri="{FF2B5EF4-FFF2-40B4-BE49-F238E27FC236}">
-                <a16:creationId xmlns:a16="http://schemas.microsoft.com/office/drawing/2014/main" id="{4EE8FA4C-CD9E-0452-3765-E82802B84778}"/>
-              </a:ext>
-            </a:extLst>
-          </p:cNvPr>
-          <p:cNvSpPr txBox="1"/>
-          <p:nvPr/>
-        </p:nvSpPr>
-        <p:spPr>
-          <a:xfrm>
-            <a:off x="7912277" y="3351875"/>
-            <a:ext cx="881844" cy="369332"/>
-          </a:xfrm>
-          <a:prstGeom prst="rect">
-            <a:avLst/>
-          </a:prstGeom>
-          <a:noFill/>
-        </p:spPr>
-        <p:txBody>
-          <a:bodyPr wrap="none" rtlCol="0">
-            <a:spAutoFit/>
-          </a:bodyPr>
-          <a:lstStyle/>
-          <a:p>
-            <a:r>
-              <a:rPr lang="en-US" dirty="0"/>
-              <a:t>Batch 4</a:t>
-            </a:r>
-          </a:p>
-        </p:txBody>
-      </p:sp>
-      <p:sp>
-        <p:nvSpPr>
-          <p:cNvPr id="39" name="TextBox 38">
-            <a:extLst>
-              <a:ext uri="{FF2B5EF4-FFF2-40B4-BE49-F238E27FC236}">
-                <a16:creationId xmlns:a16="http://schemas.microsoft.com/office/drawing/2014/main" id="{FA6ABDFD-8FB1-C14F-706A-53E3C6481937}"/>
-              </a:ext>
-            </a:extLst>
-          </p:cNvPr>
-          <p:cNvSpPr txBox="1"/>
-          <p:nvPr/>
-        </p:nvSpPr>
-        <p:spPr>
-          <a:xfrm>
-            <a:off x="10358074" y="3342460"/>
-            <a:ext cx="881844" cy="369332"/>
-          </a:xfrm>
-          <a:prstGeom prst="rect">
-            <a:avLst/>
-          </a:prstGeom>
-          <a:noFill/>
-        </p:spPr>
-        <p:txBody>
-          <a:bodyPr wrap="none" rtlCol="0">
-            <a:spAutoFit/>
-          </a:bodyPr>
-          <a:lstStyle/>
-          <a:p>
-            <a:r>
-              <a:rPr lang="en-US" dirty="0"/>
-              <a:t>Batch 5</a:t>
-            </a:r>
-          </a:p>
-        </p:txBody>
-      </p:sp>
-      <p:sp>
-        <p:nvSpPr>
-          <p:cNvPr id="42" name="TextBox 41">
-            <a:extLst>
-              <a:ext uri="{FF2B5EF4-FFF2-40B4-BE49-F238E27FC236}">
-                <a16:creationId xmlns:a16="http://schemas.microsoft.com/office/drawing/2014/main" id="{E0B36B63-349D-CDE4-7E6E-14237B403D6B}"/>
-              </a:ext>
-            </a:extLst>
-          </p:cNvPr>
-          <p:cNvSpPr txBox="1"/>
-          <p:nvPr/>
-        </p:nvSpPr>
-        <p:spPr>
-          <a:xfrm>
-            <a:off x="348635" y="4417282"/>
-            <a:ext cx="1608004" cy="461665"/>
-          </a:xfrm>
-          <a:prstGeom prst="rect">
-            <a:avLst/>
-          </a:prstGeom>
-          <a:noFill/>
-        </p:spPr>
-        <p:txBody>
-          <a:bodyPr wrap="none" rtlCol="0">
-            <a:spAutoFit/>
-          </a:bodyPr>
-          <a:lstStyle/>
-          <a:p>
-            <a:r>
-              <a:rPr lang="en-US" sz="1200" dirty="0"/>
-              <a:t>Prediction: Not a Scam</a:t>
-            </a:r>
-          </a:p>
-          <a:p>
-            <a:r>
-              <a:rPr lang="en-US" sz="1200" dirty="0"/>
-              <a:t>Probability: 83%</a:t>
-            </a:r>
-          </a:p>
-        </p:txBody>
-      </p:sp>
-      <p:sp>
-        <p:nvSpPr>
-          <p:cNvPr id="43" name="TextBox 42">
-            <a:extLst>
-              <a:ext uri="{FF2B5EF4-FFF2-40B4-BE49-F238E27FC236}">
-                <a16:creationId xmlns:a16="http://schemas.microsoft.com/office/drawing/2014/main" id="{1309E7C8-129C-721D-36F6-B4DB050BA572}"/>
-              </a:ext>
-            </a:extLst>
-          </p:cNvPr>
-          <p:cNvSpPr txBox="1"/>
-          <p:nvPr/>
-        </p:nvSpPr>
-        <p:spPr>
-          <a:xfrm>
-            <a:off x="2695101" y="4417282"/>
-            <a:ext cx="1608004" cy="461665"/>
-          </a:xfrm>
-          <a:prstGeom prst="rect">
-            <a:avLst/>
-          </a:prstGeom>
-          <a:noFill/>
-        </p:spPr>
-        <p:txBody>
-          <a:bodyPr wrap="none" rtlCol="0">
-            <a:spAutoFit/>
-          </a:bodyPr>
-          <a:lstStyle/>
-          <a:p>
-            <a:r>
-              <a:rPr lang="en-US" sz="1200" dirty="0"/>
-              <a:t>Prediction: Not a Scam</a:t>
-            </a:r>
-          </a:p>
-          <a:p>
-            <a:r>
-              <a:rPr lang="en-US" sz="1200" dirty="0"/>
-              <a:t>Probability: 80%</a:t>
-            </a:r>
-          </a:p>
-        </p:txBody>
-      </p:sp>
-      <p:sp>
-        <p:nvSpPr>
-          <p:cNvPr id="44" name="TextBox 43">
-            <a:extLst>
-              <a:ext uri="{FF2B5EF4-FFF2-40B4-BE49-F238E27FC236}">
-                <a16:creationId xmlns:a16="http://schemas.microsoft.com/office/drawing/2014/main" id="{E8FA399B-E914-3CEE-5459-E96BB6CEF37D}"/>
-              </a:ext>
-            </a:extLst>
-          </p:cNvPr>
-          <p:cNvSpPr txBox="1"/>
-          <p:nvPr/>
-        </p:nvSpPr>
-        <p:spPr>
-          <a:xfrm>
-            <a:off x="5041567" y="4417281"/>
-            <a:ext cx="1608004" cy="461665"/>
-          </a:xfrm>
-          <a:prstGeom prst="rect">
-            <a:avLst/>
-          </a:prstGeom>
-          <a:noFill/>
-        </p:spPr>
-        <p:txBody>
-          <a:bodyPr wrap="none" rtlCol="0">
-            <a:spAutoFit/>
-          </a:bodyPr>
-          <a:lstStyle/>
-          <a:p>
-            <a:r>
-              <a:rPr lang="en-US" sz="1200" dirty="0"/>
-              <a:t>Prediction: Not a Scam</a:t>
-            </a:r>
-          </a:p>
-          <a:p>
-            <a:r>
-              <a:rPr lang="en-US" sz="1200" dirty="0"/>
-              <a:t>Probability: 81%</a:t>
-            </a:r>
-          </a:p>
-        </p:txBody>
-      </p:sp>
-      <p:sp>
-        <p:nvSpPr>
-          <p:cNvPr id="45" name="TextBox 44">
-            <a:extLst>
-              <a:ext uri="{FF2B5EF4-FFF2-40B4-BE49-F238E27FC236}">
-                <a16:creationId xmlns:a16="http://schemas.microsoft.com/office/drawing/2014/main" id="{FA93AD54-9C4B-465F-BF86-F940898C7B66}"/>
-              </a:ext>
-            </a:extLst>
-          </p:cNvPr>
-          <p:cNvSpPr txBox="1"/>
-          <p:nvPr/>
-        </p:nvSpPr>
-        <p:spPr>
-          <a:xfrm>
-            <a:off x="7468047" y="4427603"/>
-            <a:ext cx="1608004" cy="461665"/>
-          </a:xfrm>
-          <a:prstGeom prst="rect">
-            <a:avLst/>
-          </a:prstGeom>
-          <a:noFill/>
-        </p:spPr>
-        <p:txBody>
-          <a:bodyPr wrap="none" rtlCol="0">
-            <a:spAutoFit/>
-          </a:bodyPr>
-          <a:lstStyle/>
-          <a:p>
-            <a:r>
-              <a:rPr lang="en-US" sz="1200" dirty="0"/>
-              <a:t>Prediction: Not a Scam</a:t>
-            </a:r>
-          </a:p>
-          <a:p>
-            <a:r>
-              <a:rPr lang="en-US" sz="1200" dirty="0"/>
-              <a:t>Probability: 82%</a:t>
-            </a:r>
-          </a:p>
-        </p:txBody>
-      </p:sp>
-      <p:sp>
-        <p:nvSpPr>
-          <p:cNvPr id="46" name="TextBox 45">
-            <a:extLst>
-              <a:ext uri="{FF2B5EF4-FFF2-40B4-BE49-F238E27FC236}">
-                <a16:creationId xmlns:a16="http://schemas.microsoft.com/office/drawing/2014/main" id="{9E577945-ABD9-55FC-9AF0-94399DD7AF9C}"/>
-              </a:ext>
-            </a:extLst>
-          </p:cNvPr>
-          <p:cNvSpPr txBox="1"/>
-          <p:nvPr/>
-        </p:nvSpPr>
-        <p:spPr>
-          <a:xfrm>
-            <a:off x="9927529" y="4388704"/>
-            <a:ext cx="1608004" cy="461665"/>
-          </a:xfrm>
-          <a:prstGeom prst="rect">
-            <a:avLst/>
-          </a:prstGeom>
-          <a:noFill/>
-        </p:spPr>
-        <p:txBody>
-          <a:bodyPr wrap="none" rtlCol="0">
-            <a:spAutoFit/>
-          </a:bodyPr>
-          <a:lstStyle/>
-          <a:p>
-            <a:r>
-              <a:rPr lang="en-US" sz="1200" dirty="0"/>
-              <a:t>Prediction: Not a Scam</a:t>
-            </a:r>
-          </a:p>
-          <a:p>
-            <a:r>
-              <a:rPr lang="en-US" sz="1200" dirty="0"/>
-              <a:t>Probability: 80%</a:t>
-            </a:r>
-          </a:p>
-        </p:txBody>
-      </p:sp>
     </p:spTree>
     <p:extLst>
       <p:ext uri="{BB962C8B-B14F-4D97-AF65-F5344CB8AC3E}">

</xml_diff>

<commit_message>
New Data, Code Fixes, Additional Metrics, Retraining
</commit_message>
<xml_diff>
--- a/Testing Results/Vishing_Testing_Results_v2.0.pptx
+++ b/Testing Results/Vishing_Testing_Results_v2.0.pptx
@@ -278,7 +278,7 @@
           <a:p>
             <a:fld id="{F09E5490-7079-428D-BA25-82A7CA4C46C9}" type="datetimeFigureOut">
               <a:rPr lang="en-US" smtClean="0"/>
-              <a:t>1/5/2024</a:t>
+              <a:t>1/6/2024</a:t>
             </a:fld>
             <a:endParaRPr lang="en-US"/>
           </a:p>
@@ -476,7 +476,7 @@
           <a:p>
             <a:fld id="{F09E5490-7079-428D-BA25-82A7CA4C46C9}" type="datetimeFigureOut">
               <a:rPr lang="en-US" smtClean="0"/>
-              <a:t>1/5/2024</a:t>
+              <a:t>1/6/2024</a:t>
             </a:fld>
             <a:endParaRPr lang="en-US"/>
           </a:p>
@@ -684,7 +684,7 @@
           <a:p>
             <a:fld id="{F09E5490-7079-428D-BA25-82A7CA4C46C9}" type="datetimeFigureOut">
               <a:rPr lang="en-US" smtClean="0"/>
-              <a:t>1/5/2024</a:t>
+              <a:t>1/6/2024</a:t>
             </a:fld>
             <a:endParaRPr lang="en-US"/>
           </a:p>
@@ -882,7 +882,7 @@
           <a:p>
             <a:fld id="{F09E5490-7079-428D-BA25-82A7CA4C46C9}" type="datetimeFigureOut">
               <a:rPr lang="en-US" smtClean="0"/>
-              <a:t>1/5/2024</a:t>
+              <a:t>1/6/2024</a:t>
             </a:fld>
             <a:endParaRPr lang="en-US"/>
           </a:p>
@@ -1157,7 +1157,7 @@
           <a:p>
             <a:fld id="{F09E5490-7079-428D-BA25-82A7CA4C46C9}" type="datetimeFigureOut">
               <a:rPr lang="en-US" smtClean="0"/>
-              <a:t>1/5/2024</a:t>
+              <a:t>1/6/2024</a:t>
             </a:fld>
             <a:endParaRPr lang="en-US"/>
           </a:p>
@@ -1422,7 +1422,7 @@
           <a:p>
             <a:fld id="{F09E5490-7079-428D-BA25-82A7CA4C46C9}" type="datetimeFigureOut">
               <a:rPr lang="en-US" smtClean="0"/>
-              <a:t>1/5/2024</a:t>
+              <a:t>1/6/2024</a:t>
             </a:fld>
             <a:endParaRPr lang="en-US"/>
           </a:p>
@@ -1834,7 +1834,7 @@
           <a:p>
             <a:fld id="{F09E5490-7079-428D-BA25-82A7CA4C46C9}" type="datetimeFigureOut">
               <a:rPr lang="en-US" smtClean="0"/>
-              <a:t>1/5/2024</a:t>
+              <a:t>1/6/2024</a:t>
             </a:fld>
             <a:endParaRPr lang="en-US"/>
           </a:p>
@@ -1975,7 +1975,7 @@
           <a:p>
             <a:fld id="{F09E5490-7079-428D-BA25-82A7CA4C46C9}" type="datetimeFigureOut">
               <a:rPr lang="en-US" smtClean="0"/>
-              <a:t>1/5/2024</a:t>
+              <a:t>1/6/2024</a:t>
             </a:fld>
             <a:endParaRPr lang="en-US"/>
           </a:p>
@@ -2088,7 +2088,7 @@
           <a:p>
             <a:fld id="{F09E5490-7079-428D-BA25-82A7CA4C46C9}" type="datetimeFigureOut">
               <a:rPr lang="en-US" smtClean="0"/>
-              <a:t>1/5/2024</a:t>
+              <a:t>1/6/2024</a:t>
             </a:fld>
             <a:endParaRPr lang="en-US"/>
           </a:p>
@@ -2399,7 +2399,7 @@
           <a:p>
             <a:fld id="{F09E5490-7079-428D-BA25-82A7CA4C46C9}" type="datetimeFigureOut">
               <a:rPr lang="en-US" smtClean="0"/>
-              <a:t>1/5/2024</a:t>
+              <a:t>1/6/2024</a:t>
             </a:fld>
             <a:endParaRPr lang="en-US"/>
           </a:p>
@@ -2687,7 +2687,7 @@
           <a:p>
             <a:fld id="{F09E5490-7079-428D-BA25-82A7CA4C46C9}" type="datetimeFigureOut">
               <a:rPr lang="en-US" smtClean="0"/>
-              <a:t>1/5/2024</a:t>
+              <a:t>1/6/2024</a:t>
             </a:fld>
             <a:endParaRPr lang="en-US"/>
           </a:p>
@@ -2928,7 +2928,7 @@
           <a:p>
             <a:fld id="{F09E5490-7079-428D-BA25-82A7CA4C46C9}" type="datetimeFigureOut">
               <a:rPr lang="en-US" smtClean="0"/>
-              <a:t>1/5/2024</a:t>
+              <a:t>1/6/2024</a:t>
             </a:fld>
             <a:endParaRPr lang="en-US"/>
           </a:p>

</xml_diff>